<commit_message>
Updated knn script to use 5 neighbours, and created a visual to show this
</commit_message>
<xml_diff>
--- a/06.Presentation/A3videoA42pptx_SV Slides.pptx
+++ b/06.Presentation/A3videoA42pptx_SV Slides.pptx
@@ -20735,7 +20735,7 @@
           </a:ln>
           <a:extLst>
             <a:ext uri="{C572A759-6A51-4108-AA02-DFA0A04FC94B}">
-              <ma14:wrappingTextBoxFlag xmlns:ma14="http://schemas.microsoft.com/office/mac/drawingml/2011/main" xmlns:a14="http://schemas.microsoft.com/office/drawing/2010/main" xmlns:m="http://schemas.openxmlformats.org/officeDocument/2006/math" xmlns="" val="1"/>
+              <ma14:wrappingTextBoxFlag xmlns="" xmlns:m="http://schemas.openxmlformats.org/officeDocument/2006/math" xmlns:a14="http://schemas.microsoft.com/office/drawing/2010/main" xmlns:ma14="http://schemas.microsoft.com/office/mac/drawingml/2011/main" val="1"/>
             </a:ext>
           </a:extLst>
         </p:spPr>
@@ -21147,7 +21147,7 @@
           </a:ln>
           <a:extLst>
             <a:ext uri="{C572A759-6A51-4108-AA02-DFA0A04FC94B}">
-              <ma14:wrappingTextBoxFlag xmlns:ma14="http://schemas.microsoft.com/office/mac/drawingml/2011/main" xmlns:a14="http://schemas.microsoft.com/office/drawing/2010/main" xmlns:m="http://schemas.openxmlformats.org/officeDocument/2006/math" xmlns="" val="1"/>
+              <ma14:wrappingTextBoxFlag xmlns="" xmlns:m="http://schemas.openxmlformats.org/officeDocument/2006/math" xmlns:a14="http://schemas.microsoft.com/office/drawing/2010/main" xmlns:ma14="http://schemas.microsoft.com/office/mac/drawingml/2011/main" val="1"/>
             </a:ext>
           </a:extLst>
         </p:spPr>
@@ -21594,7 +21594,7 @@
           </a:ln>
           <a:extLst>
             <a:ext uri="{C572A759-6A51-4108-AA02-DFA0A04FC94B}">
-              <ma14:wrappingTextBoxFlag xmlns:ma14="http://schemas.microsoft.com/office/mac/drawingml/2011/main" xmlns:a14="http://schemas.microsoft.com/office/drawing/2010/main" xmlns:m="http://schemas.openxmlformats.org/officeDocument/2006/math" xmlns="" val="1"/>
+              <ma14:wrappingTextBoxFlag xmlns="" xmlns:m="http://schemas.openxmlformats.org/officeDocument/2006/math" xmlns:a14="http://schemas.microsoft.com/office/drawing/2010/main" xmlns:ma14="http://schemas.microsoft.com/office/mac/drawingml/2011/main" val="1"/>
             </a:ext>
           </a:extLst>
         </p:spPr>
@@ -21804,7 +21804,7 @@
           </a:ln>
           <a:extLst>
             <a:ext uri="{C572A759-6A51-4108-AA02-DFA0A04FC94B}">
-              <ma14:wrappingTextBoxFlag xmlns:ma14="http://schemas.microsoft.com/office/mac/drawingml/2011/main" xmlns:a14="http://schemas.microsoft.com/office/drawing/2010/main" xmlns:m="http://schemas.openxmlformats.org/officeDocument/2006/math" xmlns="" val="1"/>
+              <ma14:wrappingTextBoxFlag xmlns="" xmlns:m="http://schemas.openxmlformats.org/officeDocument/2006/math" xmlns:a14="http://schemas.microsoft.com/office/drawing/2010/main" xmlns:ma14="http://schemas.microsoft.com/office/mac/drawingml/2011/main" val="1"/>
             </a:ext>
           </a:extLst>
         </p:spPr>
@@ -30837,21 +30837,21 @@
 </file>
 
 <file path=customXml/item1.xml><?xml version="1.0" encoding="utf-8"?>
+<TemplafyFormConfiguration><![CDATA[{"formFields":[],"formDataEntries":[]}]]></TemplafyFormConfiguration>
+</file>
+
+<file path=customXml/item2.xml><?xml version="1.0" encoding="utf-8"?>
 <TemplafyTemplateConfiguration><![CDATA[{"elementsMetadata":[],"transformationConfigurations":[],"templateName":"Template 2024","templateDescription":"","enableDocumentContentUpdater":false,"version":"2.0"}]]></TemplafyTemplateConfiguration>
 </file>
 
-<file path=customXml/item2.xml><?xml version="1.0" encoding="utf-8"?>
-<TemplafyFormConfiguration><![CDATA[{"formFields":[],"formDataEntries":[]}]]></TemplafyFormConfiguration>
-</file>
-
 <file path=customXml/itemProps1.xml><?xml version="1.0" encoding="utf-8"?>
-<ds:datastoreItem xmlns:ds="http://schemas.openxmlformats.org/officeDocument/2006/customXml" ds:itemID="{43877E11-121F-45E2-A0FE-16DFA988BBD5}">
+<ds:datastoreItem xmlns:ds="http://schemas.openxmlformats.org/officeDocument/2006/customXml" ds:itemID="{9A03A13C-D5E3-49F8-B37D-AFA024345652}">
   <ds:schemaRefs/>
 </ds:datastoreItem>
 </file>
 
 <file path=customXml/itemProps2.xml><?xml version="1.0" encoding="utf-8"?>
-<ds:datastoreItem xmlns:ds="http://schemas.openxmlformats.org/officeDocument/2006/customXml" ds:itemID="{9A03A13C-D5E3-49F8-B37D-AFA024345652}">
+<ds:datastoreItem xmlns:ds="http://schemas.openxmlformats.org/officeDocument/2006/customXml" ds:itemID="{43877E11-121F-45E2-A0FE-16DFA988BBD5}">
   <ds:schemaRefs/>
 </ds:datastoreItem>
 </file>
</xml_diff>